<commit_message>
Lending club case study updated Ppt
</commit_message>
<xml_diff>
--- a/Amrita_Kaur_Lending_Club_Case_Study.pptx
+++ b/Amrita_Kaur_Lending_Club_Case_Study.pptx
@@ -5,7 +5,7 @@
     <p:sldMasterId id="2147483672" r:id="rId1"/>
   </p:sldMasterIdLst>
   <p:notesMasterIdLst>
-    <p:notesMasterId r:id="rId21"/>
+    <p:notesMasterId r:id="rId23"/>
   </p:notesMasterIdLst>
   <p:sldIdLst>
     <p:sldId id="256" r:id="rId2"/>
@@ -26,35 +26,37 @@
     <p:sldId id="313" r:id="rId17"/>
     <p:sldId id="314" r:id="rId18"/>
     <p:sldId id="315" r:id="rId19"/>
-    <p:sldId id="316" r:id="rId20"/>
+    <p:sldId id="318" r:id="rId20"/>
+    <p:sldId id="317" r:id="rId21"/>
+    <p:sldId id="316" r:id="rId22"/>
   </p:sldIdLst>
   <p:sldSz cx="9144000" cy="5143500" type="screen16x9"/>
   <p:notesSz cx="6858000" cy="9144000"/>
   <p:embeddedFontLst>
     <p:embeddedFont>
       <p:font typeface="Century Gothic" panose="020B0502020202020204" pitchFamily="34" charset="0"/>
-      <p:regular r:id="rId22"/>
-      <p:bold r:id="rId23"/>
-      <p:italic r:id="rId24"/>
-      <p:boldItalic r:id="rId25"/>
+      <p:regular r:id="rId24"/>
+      <p:bold r:id="rId25"/>
+      <p:italic r:id="rId26"/>
+      <p:boldItalic r:id="rId27"/>
     </p:embeddedFont>
     <p:embeddedFont>
       <p:font typeface="Poppins" panose="00000500000000000000" pitchFamily="2" charset="0"/>
-      <p:regular r:id="rId26"/>
-      <p:bold r:id="rId27"/>
-      <p:italic r:id="rId28"/>
-      <p:boldItalic r:id="rId29"/>
+      <p:regular r:id="rId28"/>
+      <p:bold r:id="rId29"/>
+      <p:italic r:id="rId30"/>
+      <p:boldItalic r:id="rId31"/>
     </p:embeddedFont>
     <p:embeddedFont>
       <p:font typeface="Poppins Medium" panose="00000600000000000000" pitchFamily="2" charset="0"/>
-      <p:regular r:id="rId30"/>
-      <p:bold r:id="rId31"/>
-      <p:italic r:id="rId32"/>
-      <p:boldItalic r:id="rId33"/>
+      <p:regular r:id="rId32"/>
+      <p:bold r:id="rId33"/>
+      <p:italic r:id="rId34"/>
+      <p:boldItalic r:id="rId35"/>
     </p:embeddedFont>
     <p:embeddedFont>
       <p:font typeface="Wingdings 3" panose="05040102010807070707" pitchFamily="18" charset="2"/>
-      <p:regular r:id="rId34"/>
+      <p:regular r:id="rId36"/>
     </p:embeddedFont>
   </p:embeddedFontLst>
   <p:defaultTextStyle>
@@ -175,6 +177,8 @@
             <p14:sldId id="313"/>
             <p14:sldId id="314"/>
             <p14:sldId id="315"/>
+            <p14:sldId id="318"/>
+            <p14:sldId id="317"/>
             <p14:sldId id="316"/>
           </p14:sldIdLst>
         </p14:section>
@@ -15735,7 +15739,7 @@
   <p:cSld>
     <p:spTree>
       <p:nvGrpSpPr>
-        <p:cNvPr id="1" name="Shape 316"/>
+        <p:cNvPr id="1" name=""/>
         <p:cNvGrpSpPr/>
         <p:nvPr/>
       </p:nvGrpSpPr>
@@ -15749,387 +15753,109 @@
       </p:grpSpPr>
       <p:sp>
         <p:nvSpPr>
-          <p:cNvPr id="317" name="Google Shape;317;p34"/>
-          <p:cNvSpPr txBox="1">
+          <p:cNvPr id="2" name="Title 1">
+            <a:extLst>
+              <a:ext uri="{FF2B5EF4-FFF2-40B4-BE49-F238E27FC236}">
+                <a16:creationId xmlns:a16="http://schemas.microsoft.com/office/drawing/2014/main" id="{A4BE737D-AE93-271D-F196-9F201CE5DB59}"/>
+              </a:ext>
+            </a:extLst>
+          </p:cNvPr>
+          <p:cNvSpPr>
             <a:spLocks noGrp="1"/>
           </p:cNvSpPr>
           <p:nvPr>
             <p:ph type="title"/>
           </p:nvPr>
         </p:nvSpPr>
+        <p:spPr/>
+        <p:txBody>
+          <a:bodyPr/>
+          <a:lstStyle/>
+          <a:p>
+            <a:pPr algn="ctr"/>
+            <a:r>
+              <a:rPr lang="en-IN" dirty="0"/>
+              <a:t>Weight of evidence (</a:t>
+            </a:r>
+            <a:r>
+              <a:rPr lang="en-IN" dirty="0" err="1"/>
+              <a:t>WoE</a:t>
+            </a:r>
+            <a:r>
+              <a:rPr lang="en-IN" dirty="0"/>
+              <a:t>)</a:t>
+            </a:r>
+          </a:p>
+        </p:txBody>
+      </p:sp>
+      <p:sp>
+        <p:nvSpPr>
+          <p:cNvPr id="3" name="Content Placeholder 2">
+            <a:extLst>
+              <a:ext uri="{FF2B5EF4-FFF2-40B4-BE49-F238E27FC236}">
+                <a16:creationId xmlns:a16="http://schemas.microsoft.com/office/drawing/2014/main" id="{CB8D0A7A-CD54-FCEE-EA94-977F6B7DE292}"/>
+              </a:ext>
+            </a:extLst>
+          </p:cNvPr>
+          <p:cNvSpPr>
+            <a:spLocks noGrp="1"/>
+          </p:cNvSpPr>
+          <p:nvPr>
+            <p:ph idx="1"/>
+          </p:nvPr>
+        </p:nvSpPr>
         <p:spPr>
           <a:xfrm>
-            <a:off x="2749290" y="832757"/>
-            <a:ext cx="7427098" cy="578376"/>
+            <a:off x="5431496" y="1797916"/>
+            <a:ext cx="3555485" cy="1547668"/>
+          </a:xfrm>
+        </p:spPr>
+        <p:txBody>
+          <a:bodyPr/>
+          <a:lstStyle/>
+          <a:p>
+            <a:r>
+              <a:rPr lang="en-US" dirty="0"/>
+              <a:t>In the example above, the bins with a significantly positive weight of evidence compared to other bins of the same feature have good predictive power for identifying defaulters.</a:t>
+            </a:r>
+            <a:endParaRPr lang="en-IN" dirty="0"/>
+          </a:p>
+        </p:txBody>
+      </p:sp>
+      <p:pic>
+        <p:nvPicPr>
+          <p:cNvPr id="5" name="Picture 4">
+            <a:extLst>
+              <a:ext uri="{FF2B5EF4-FFF2-40B4-BE49-F238E27FC236}">
+                <a16:creationId xmlns:a16="http://schemas.microsoft.com/office/drawing/2014/main" id="{265A9628-4497-93A6-EF07-053B4113015A}"/>
+              </a:ext>
+            </a:extLst>
+          </p:cNvPr>
+          <p:cNvPicPr>
+            <a:picLocks noChangeAspect="1"/>
+          </p:cNvPicPr>
+          <p:nvPr/>
+        </p:nvPicPr>
+        <p:blipFill>
+          <a:blip r:embed="rId2"/>
+          <a:stretch>
+            <a:fillRect/>
+          </a:stretch>
+        </p:blipFill>
+        <p:spPr>
+          <a:xfrm>
+            <a:off x="430659" y="1044844"/>
+            <a:ext cx="4799973" cy="3943927"/>
           </a:xfrm>
           <a:prstGeom prst="rect">
             <a:avLst/>
           </a:prstGeom>
         </p:spPr>
-        <p:txBody>
-          <a:bodyPr spcFirstLastPara="1" wrap="square" lIns="91425" tIns="91425" rIns="91425" bIns="91425" anchor="ctr" anchorCtr="0">
-            <a:noAutofit/>
-          </a:bodyPr>
-          <a:lstStyle/>
-          <a:p>
-            <a:pPr marL="0" lvl="0" indent="0" algn="l" rtl="0">
-              <a:spcBef>
-                <a:spcPts val="0"/>
-              </a:spcBef>
-              <a:spcAft>
-                <a:spcPts val="0"/>
-              </a:spcAft>
-              <a:buNone/>
-            </a:pPr>
-            <a:r>
-              <a:rPr lang="en-IN" sz="4400" b="0" dirty="0">
-                <a:latin typeface="Poppins Medium"/>
-                <a:ea typeface="Poppins Medium"/>
-                <a:cs typeface="Poppins Medium"/>
-                <a:sym typeface="Poppins Medium"/>
-              </a:rPr>
-              <a:t>Conclusion</a:t>
-            </a:r>
-            <a:endParaRPr sz="4400" b="0" dirty="0">
-              <a:latin typeface="Poppins Medium"/>
-              <a:ea typeface="Poppins Medium"/>
-              <a:cs typeface="Poppins Medium"/>
-              <a:sym typeface="Poppins Medium"/>
-            </a:endParaRPr>
-          </a:p>
-        </p:txBody>
-      </p:sp>
-      <p:sp>
-        <p:nvSpPr>
-          <p:cNvPr id="3" name="Google Shape;241;p30">
-            <a:extLst>
-              <a:ext uri="{FF2B5EF4-FFF2-40B4-BE49-F238E27FC236}">
-                <a16:creationId xmlns:a16="http://schemas.microsoft.com/office/drawing/2014/main" id="{CA616DD8-4DA9-4C77-D751-34BDD320DD9F}"/>
-              </a:ext>
-            </a:extLst>
-          </p:cNvPr>
-          <p:cNvSpPr txBox="1">
-            <a:spLocks/>
-          </p:cNvSpPr>
-          <p:nvPr/>
-        </p:nvSpPr>
-        <p:spPr>
-          <a:xfrm>
-            <a:off x="900649" y="1787548"/>
-            <a:ext cx="7232697" cy="2261937"/>
-          </a:xfrm>
-          <a:prstGeom prst="rect">
-            <a:avLst/>
-          </a:prstGeom>
-          <a:solidFill>
-            <a:schemeClr val="lt2"/>
-          </a:solidFill>
-          <a:ln w="9525" cap="flat" cmpd="sng">
-            <a:solidFill>
-              <a:schemeClr val="dk1"/>
-            </a:solidFill>
-            <a:prstDash val="solid"/>
-            <a:round/>
-            <a:headEnd type="none" w="sm" len="sm"/>
-            <a:tailEnd type="none" w="sm" len="sm"/>
-          </a:ln>
-        </p:spPr>
-        <p:txBody>
-          <a:bodyPr spcFirstLastPara="1" wrap="square" lIns="91425" tIns="91425" rIns="91425" bIns="91425" anchor="ctr" anchorCtr="0">
-            <a:noAutofit/>
-          </a:bodyPr>
-          <a:lstStyle>
-            <a:defPPr marR="0" lvl="0" algn="l" rtl="0">
-              <a:lnSpc>
-                <a:spcPct val="100000"/>
-              </a:lnSpc>
-              <a:spcBef>
-                <a:spcPts val="0"/>
-              </a:spcBef>
-              <a:spcAft>
-                <a:spcPts val="0"/>
-              </a:spcAft>
-            </a:defPPr>
-            <a:lvl1pPr marL="457200" marR="0" lvl="0" indent="-304800" algn="l" rtl="0">
-              <a:lnSpc>
-                <a:spcPct val="100000"/>
-              </a:lnSpc>
-              <a:spcBef>
-                <a:spcPts val="0"/>
-              </a:spcBef>
-              <a:spcAft>
-                <a:spcPts val="0"/>
-              </a:spcAft>
-              <a:buClr>
-                <a:schemeClr val="lt1"/>
-              </a:buClr>
-              <a:buSzPts val="1200"/>
-              <a:buFont typeface="Livvic"/>
-              <a:buNone/>
-              <a:defRPr sz="1400" b="0" i="0" u="none" strike="noStrike" cap="none">
-                <a:solidFill>
-                  <a:schemeClr val="dk1"/>
-                </a:solidFill>
-                <a:latin typeface="Livvic"/>
-                <a:ea typeface="Livvic"/>
-                <a:cs typeface="Livvic"/>
-                <a:sym typeface="Livvic"/>
-              </a:defRPr>
-            </a:lvl1pPr>
-            <a:lvl2pPr marL="914400" marR="0" lvl="1" indent="-304800" algn="l" rtl="0">
-              <a:lnSpc>
-                <a:spcPct val="115000"/>
-              </a:lnSpc>
-              <a:spcBef>
-                <a:spcPts val="0"/>
-              </a:spcBef>
-              <a:spcAft>
-                <a:spcPts val="0"/>
-              </a:spcAft>
-              <a:buClr>
-                <a:schemeClr val="lt1"/>
-              </a:buClr>
-              <a:buSzPts val="1200"/>
-              <a:buFont typeface="Livvic"/>
-              <a:buNone/>
-              <a:defRPr sz="1200" b="0" i="0" u="none" strike="noStrike" cap="none">
-                <a:solidFill>
-                  <a:schemeClr val="lt1"/>
-                </a:solidFill>
-                <a:latin typeface="Livvic"/>
-                <a:ea typeface="Livvic"/>
-                <a:cs typeface="Livvic"/>
-                <a:sym typeface="Livvic"/>
-              </a:defRPr>
-            </a:lvl2pPr>
-            <a:lvl3pPr marL="1371600" marR="0" lvl="2" indent="-304800" algn="l" rtl="0">
-              <a:lnSpc>
-                <a:spcPct val="115000"/>
-              </a:lnSpc>
-              <a:spcBef>
-                <a:spcPts val="0"/>
-              </a:spcBef>
-              <a:spcAft>
-                <a:spcPts val="0"/>
-              </a:spcAft>
-              <a:buClr>
-                <a:schemeClr val="lt1"/>
-              </a:buClr>
-              <a:buSzPts val="1200"/>
-              <a:buFont typeface="Livvic"/>
-              <a:buNone/>
-              <a:defRPr sz="1200" b="0" i="0" u="none" strike="noStrike" cap="none">
-                <a:solidFill>
-                  <a:schemeClr val="lt1"/>
-                </a:solidFill>
-                <a:latin typeface="Livvic"/>
-                <a:ea typeface="Livvic"/>
-                <a:cs typeface="Livvic"/>
-                <a:sym typeface="Livvic"/>
-              </a:defRPr>
-            </a:lvl3pPr>
-            <a:lvl4pPr marL="1828800" marR="0" lvl="3" indent="-304800" algn="l" rtl="0">
-              <a:lnSpc>
-                <a:spcPct val="115000"/>
-              </a:lnSpc>
-              <a:spcBef>
-                <a:spcPts val="0"/>
-              </a:spcBef>
-              <a:spcAft>
-                <a:spcPts val="0"/>
-              </a:spcAft>
-              <a:buClr>
-                <a:schemeClr val="lt1"/>
-              </a:buClr>
-              <a:buSzPts val="1200"/>
-              <a:buFont typeface="Livvic"/>
-              <a:buNone/>
-              <a:defRPr sz="1200" b="0" i="0" u="none" strike="noStrike" cap="none">
-                <a:solidFill>
-                  <a:schemeClr val="lt1"/>
-                </a:solidFill>
-                <a:latin typeface="Livvic"/>
-                <a:ea typeface="Livvic"/>
-                <a:cs typeface="Livvic"/>
-                <a:sym typeface="Livvic"/>
-              </a:defRPr>
-            </a:lvl4pPr>
-            <a:lvl5pPr marL="2286000" marR="0" lvl="4" indent="-304800" algn="l" rtl="0">
-              <a:lnSpc>
-                <a:spcPct val="115000"/>
-              </a:lnSpc>
-              <a:spcBef>
-                <a:spcPts val="0"/>
-              </a:spcBef>
-              <a:spcAft>
-                <a:spcPts val="0"/>
-              </a:spcAft>
-              <a:buClr>
-                <a:schemeClr val="lt1"/>
-              </a:buClr>
-              <a:buSzPts val="1200"/>
-              <a:buFont typeface="Livvic"/>
-              <a:buNone/>
-              <a:defRPr sz="1200" b="0" i="0" u="none" strike="noStrike" cap="none">
-                <a:solidFill>
-                  <a:schemeClr val="lt1"/>
-                </a:solidFill>
-                <a:latin typeface="Livvic"/>
-                <a:ea typeface="Livvic"/>
-                <a:cs typeface="Livvic"/>
-                <a:sym typeface="Livvic"/>
-              </a:defRPr>
-            </a:lvl5pPr>
-            <a:lvl6pPr marL="2743200" marR="0" lvl="5" indent="-304800" algn="l" rtl="0">
-              <a:lnSpc>
-                <a:spcPct val="115000"/>
-              </a:lnSpc>
-              <a:spcBef>
-                <a:spcPts val="0"/>
-              </a:spcBef>
-              <a:spcAft>
-                <a:spcPts val="0"/>
-              </a:spcAft>
-              <a:buClr>
-                <a:schemeClr val="lt1"/>
-              </a:buClr>
-              <a:buSzPts val="1200"/>
-              <a:buFont typeface="Livvic"/>
-              <a:buNone/>
-              <a:defRPr sz="1200" b="0" i="0" u="none" strike="noStrike" cap="none">
-                <a:solidFill>
-                  <a:schemeClr val="lt1"/>
-                </a:solidFill>
-                <a:latin typeface="Livvic"/>
-                <a:ea typeface="Livvic"/>
-                <a:cs typeface="Livvic"/>
-                <a:sym typeface="Livvic"/>
-              </a:defRPr>
-            </a:lvl6pPr>
-            <a:lvl7pPr marL="3200400" marR="0" lvl="6" indent="-304800" algn="l" rtl="0">
-              <a:lnSpc>
-                <a:spcPct val="115000"/>
-              </a:lnSpc>
-              <a:spcBef>
-                <a:spcPts val="0"/>
-              </a:spcBef>
-              <a:spcAft>
-                <a:spcPts val="0"/>
-              </a:spcAft>
-              <a:buClr>
-                <a:schemeClr val="lt1"/>
-              </a:buClr>
-              <a:buSzPts val="1200"/>
-              <a:buFont typeface="Livvic"/>
-              <a:buNone/>
-              <a:defRPr sz="1200" b="0" i="0" u="none" strike="noStrike" cap="none">
-                <a:solidFill>
-                  <a:schemeClr val="lt1"/>
-                </a:solidFill>
-                <a:latin typeface="Livvic"/>
-                <a:ea typeface="Livvic"/>
-                <a:cs typeface="Livvic"/>
-                <a:sym typeface="Livvic"/>
-              </a:defRPr>
-            </a:lvl7pPr>
-            <a:lvl8pPr marL="3657600" marR="0" lvl="7" indent="-304800" algn="l" rtl="0">
-              <a:lnSpc>
-                <a:spcPct val="115000"/>
-              </a:lnSpc>
-              <a:spcBef>
-                <a:spcPts val="0"/>
-              </a:spcBef>
-              <a:spcAft>
-                <a:spcPts val="0"/>
-              </a:spcAft>
-              <a:buClr>
-                <a:schemeClr val="lt1"/>
-              </a:buClr>
-              <a:buSzPts val="1200"/>
-              <a:buFont typeface="Livvic"/>
-              <a:buNone/>
-              <a:defRPr sz="1200" b="0" i="0" u="none" strike="noStrike" cap="none">
-                <a:solidFill>
-                  <a:schemeClr val="lt1"/>
-                </a:solidFill>
-                <a:latin typeface="Livvic"/>
-                <a:ea typeface="Livvic"/>
-                <a:cs typeface="Livvic"/>
-                <a:sym typeface="Livvic"/>
-              </a:defRPr>
-            </a:lvl8pPr>
-            <a:lvl9pPr marL="4114800" marR="0" lvl="8" indent="-304800" algn="l" rtl="0">
-              <a:lnSpc>
-                <a:spcPct val="115000"/>
-              </a:lnSpc>
-              <a:spcBef>
-                <a:spcPts val="0"/>
-              </a:spcBef>
-              <a:spcAft>
-                <a:spcPts val="0"/>
-              </a:spcAft>
-              <a:buClr>
-                <a:schemeClr val="lt1"/>
-              </a:buClr>
-              <a:buSzPts val="1200"/>
-              <a:buFont typeface="Livvic"/>
-              <a:buNone/>
-              <a:defRPr sz="1200" b="0" i="0" u="none" strike="noStrike" cap="none">
-                <a:solidFill>
-                  <a:schemeClr val="lt1"/>
-                </a:solidFill>
-                <a:latin typeface="Livvic"/>
-                <a:ea typeface="Livvic"/>
-                <a:cs typeface="Livvic"/>
-                <a:sym typeface="Livvic"/>
-              </a:defRPr>
-            </a:lvl9pPr>
-          </a:lstStyle>
-          <a:p>
-            <a:pPr algn="just"/>
-            <a:r>
-              <a:rPr lang="en-US" dirty="0"/>
-              <a:t>        </a:t>
-            </a:r>
-            <a:r>
-              <a:rPr lang="en-US" dirty="0">
-                <a:latin typeface="Calibri Light" panose="020F0302020204030204" pitchFamily="34" charset="0"/>
-                <a:ea typeface="Calibri Light" panose="020F0302020204030204" pitchFamily="34" charset="0"/>
-                <a:cs typeface="Calibri Light" panose="020F0302020204030204" pitchFamily="34" charset="0"/>
-              </a:rPr>
-              <a:t>In this examination of Lending Club loan data, our objective was to uncover the primary factors impacting loan defaults through a detailed Exploratory Data Analysis (EDA).</a:t>
-            </a:r>
-          </a:p>
-          <a:p>
-            <a:pPr algn="just"/>
-            <a:endParaRPr lang="en-US" dirty="0">
-              <a:latin typeface="Calibri Light" panose="020F0302020204030204" pitchFamily="34" charset="0"/>
-              <a:ea typeface="Calibri Light" panose="020F0302020204030204" pitchFamily="34" charset="0"/>
-              <a:cs typeface="Calibri Light" panose="020F0302020204030204" pitchFamily="34" charset="0"/>
-            </a:endParaRPr>
-          </a:p>
-          <a:p>
-            <a:pPr algn="just"/>
-            <a:r>
-              <a:rPr lang="en-US" dirty="0">
-                <a:latin typeface="Calibri Light" panose="020F0302020204030204" pitchFamily="34" charset="0"/>
-                <a:ea typeface="Calibri Light" panose="020F0302020204030204" pitchFamily="34" charset="0"/>
-                <a:cs typeface="Calibri Light" panose="020F0302020204030204" pitchFamily="34" charset="0"/>
-              </a:rPr>
-              <a:t>	The univariate and segmented univariate analyses indicated that variables like loan amount, interest rate, employment length, and debt-to-income (DTI) ratio are significant predictors of loan defaults. The bivariate analysis, which integrated these insights, reinforced our conclusions, showing that higher-risk borrowers often secured larger loans with elevated interest rates, coupled with shorter employment histories or greater financial obligations.</a:t>
-            </a:r>
-            <a:endParaRPr lang="en-US" b="1" dirty="0">
-              <a:latin typeface="Calibri Light" panose="020F0302020204030204" pitchFamily="34" charset="0"/>
-              <a:ea typeface="Calibri Light" panose="020F0302020204030204" pitchFamily="34" charset="0"/>
-              <a:cs typeface="Calibri Light" panose="020F0302020204030204" pitchFamily="34" charset="0"/>
-            </a:endParaRPr>
-          </a:p>
-        </p:txBody>
-      </p:sp>
+      </p:pic>
     </p:spTree>
     <p:extLst>
       <p:ext uri="{BB962C8B-B14F-4D97-AF65-F5344CB8AC3E}">
-        <p14:creationId xmlns:p14="http://schemas.microsoft.com/office/powerpoint/2010/main" val="1737370128"/>
+        <p14:creationId xmlns:p14="http://schemas.microsoft.com/office/powerpoint/2010/main" val="3208258180"/>
       </p:ext>
     </p:extLst>
   </p:cSld>
@@ -16894,6 +16620,602 @@
         </p:txBody>
       </p:sp>
     </p:spTree>
+  </p:cSld>
+  <p:clrMapOvr>
+    <a:masterClrMapping/>
+  </p:clrMapOvr>
+</p:sld>
+</file>
+
+<file path=ppt/slides/slide20.xml><?xml version="1.0" encoding="utf-8"?>
+<p:sld xmlns:a="http://schemas.openxmlformats.org/drawingml/2006/main" xmlns:r="http://schemas.openxmlformats.org/officeDocument/2006/relationships" xmlns:p="http://schemas.openxmlformats.org/presentationml/2006/main">
+  <p:cSld>
+    <p:spTree>
+      <p:nvGrpSpPr>
+        <p:cNvPr id="1" name=""/>
+        <p:cNvGrpSpPr/>
+        <p:nvPr/>
+      </p:nvGrpSpPr>
+      <p:grpSpPr>
+        <a:xfrm>
+          <a:off x="0" y="0"/>
+          <a:ext cx="0" cy="0"/>
+          <a:chOff x="0" y="0"/>
+          <a:chExt cx="0" cy="0"/>
+        </a:xfrm>
+      </p:grpSpPr>
+      <p:sp>
+        <p:nvSpPr>
+          <p:cNvPr id="2" name="Title 1">
+            <a:extLst>
+              <a:ext uri="{FF2B5EF4-FFF2-40B4-BE49-F238E27FC236}">
+                <a16:creationId xmlns:a16="http://schemas.microsoft.com/office/drawing/2014/main" id="{5AB294B7-AD5B-8D77-F970-A7AEF8C68ADD}"/>
+              </a:ext>
+            </a:extLst>
+          </p:cNvPr>
+          <p:cNvSpPr>
+            <a:spLocks noGrp="1"/>
+          </p:cNvSpPr>
+          <p:nvPr>
+            <p:ph type="title"/>
+          </p:nvPr>
+        </p:nvSpPr>
+        <p:spPr>
+          <a:xfrm>
+            <a:off x="1413603" y="401323"/>
+            <a:ext cx="6683765" cy="960668"/>
+          </a:xfrm>
+        </p:spPr>
+        <p:txBody>
+          <a:bodyPr/>
+          <a:lstStyle/>
+          <a:p>
+            <a:pPr algn="ctr"/>
+            <a:r>
+              <a:rPr lang="en-IN" dirty="0"/>
+              <a:t>Loan Default Prediction</a:t>
+            </a:r>
+          </a:p>
+        </p:txBody>
+      </p:sp>
+      <p:sp>
+        <p:nvSpPr>
+          <p:cNvPr id="7" name="Content Placeholder 6">
+            <a:extLst>
+              <a:ext uri="{FF2B5EF4-FFF2-40B4-BE49-F238E27FC236}">
+                <a16:creationId xmlns:a16="http://schemas.microsoft.com/office/drawing/2014/main" id="{0D35FBC4-E54B-67C9-347F-1FB912178072}"/>
+              </a:ext>
+            </a:extLst>
+          </p:cNvPr>
+          <p:cNvSpPr>
+            <a:spLocks noGrp="1"/>
+          </p:cNvSpPr>
+          <p:nvPr>
+            <p:ph idx="1"/>
+          </p:nvPr>
+        </p:nvSpPr>
+        <p:spPr>
+          <a:xfrm>
+            <a:off x="4973469" y="1600200"/>
+            <a:ext cx="3654989" cy="2833217"/>
+          </a:xfrm>
+        </p:spPr>
+        <p:txBody>
+          <a:bodyPr>
+            <a:normAutofit lnSpcReduction="10000"/>
+          </a:bodyPr>
+          <a:lstStyle/>
+          <a:p>
+            <a:pPr marL="0" indent="0">
+              <a:buNone/>
+            </a:pPr>
+            <a:r>
+              <a:rPr lang="en-US" b="1" dirty="0"/>
+              <a:t>Term</a:t>
+            </a:r>
+            <a:r>
+              <a:rPr lang="en-US" dirty="0"/>
+              <a:t>: Loans with a term of 60 months have a higher precision in predicting defaults (0.75).</a:t>
+            </a:r>
+          </a:p>
+          <a:p>
+            <a:pPr marL="0" indent="0">
+              <a:buNone/>
+            </a:pPr>
+            <a:r>
+              <a:rPr lang="en-US" b="1" dirty="0"/>
+              <a:t>Interest Rate</a:t>
+            </a:r>
+            <a:r>
+              <a:rPr lang="en-US" dirty="0"/>
+              <a:t>: Higher interest rates (15.21% - 24.4%) also show significant precision (0.74) in predicting defaults.</a:t>
+            </a:r>
+          </a:p>
+          <a:p>
+            <a:pPr marL="0" indent="0">
+              <a:buNone/>
+            </a:pPr>
+            <a:r>
+              <a:rPr lang="en-US" b="1" dirty="0"/>
+              <a:t>Last Payment Amount</a:t>
+            </a:r>
+            <a:r>
+              <a:rPr lang="en-US" dirty="0"/>
+              <a:t>: Smaller last payments (up to 177.40) have a notable precision (0.72) in predicting defaults.</a:t>
+            </a:r>
+          </a:p>
+          <a:p>
+            <a:pPr marL="0" indent="0">
+              <a:buNone/>
+            </a:pPr>
+            <a:r>
+              <a:rPr lang="en-US" b="1" dirty="0"/>
+              <a:t>Total Payment</a:t>
+            </a:r>
+            <a:r>
+              <a:rPr lang="en-US" dirty="0"/>
+              <a:t>: Lower total payments (up to 4,689.05) and its components like total payment invested and total principal received show relatively lower precision in predicting defaults (0.64 and 0.55).</a:t>
+            </a:r>
+          </a:p>
+          <a:p>
+            <a:pPr marL="0" indent="0">
+              <a:buNone/>
+            </a:pPr>
+            <a:endParaRPr lang="en-US" dirty="0"/>
+          </a:p>
+          <a:p>
+            <a:pPr marL="0" indent="0">
+              <a:buNone/>
+            </a:pPr>
+            <a:endParaRPr lang="en-IN" dirty="0"/>
+          </a:p>
+        </p:txBody>
+      </p:sp>
+      <p:pic>
+        <p:nvPicPr>
+          <p:cNvPr id="4" name="Picture 3">
+            <a:extLst>
+              <a:ext uri="{FF2B5EF4-FFF2-40B4-BE49-F238E27FC236}">
+                <a16:creationId xmlns:a16="http://schemas.microsoft.com/office/drawing/2014/main" id="{542DB93D-79C0-8141-E10E-40A35BBD710D}"/>
+              </a:ext>
+            </a:extLst>
+          </p:cNvPr>
+          <p:cNvPicPr>
+            <a:picLocks noChangeAspect="1"/>
+          </p:cNvPicPr>
+          <p:nvPr/>
+        </p:nvPicPr>
+        <p:blipFill>
+          <a:blip r:embed="rId2"/>
+          <a:stretch>
+            <a:fillRect/>
+          </a:stretch>
+        </p:blipFill>
+        <p:spPr>
+          <a:xfrm>
+            <a:off x="515541" y="1600200"/>
+            <a:ext cx="4457929" cy="2159111"/>
+          </a:xfrm>
+          <a:prstGeom prst="rect">
+            <a:avLst/>
+          </a:prstGeom>
+        </p:spPr>
+      </p:pic>
+    </p:spTree>
+    <p:extLst>
+      <p:ext uri="{BB962C8B-B14F-4D97-AF65-F5344CB8AC3E}">
+        <p14:creationId xmlns:p14="http://schemas.microsoft.com/office/powerpoint/2010/main" val="3767033436"/>
+      </p:ext>
+    </p:extLst>
+  </p:cSld>
+  <p:clrMapOvr>
+    <a:masterClrMapping/>
+  </p:clrMapOvr>
+</p:sld>
+</file>
+
+<file path=ppt/slides/slide21.xml><?xml version="1.0" encoding="utf-8"?>
+<p:sld xmlns:a="http://schemas.openxmlformats.org/drawingml/2006/main" xmlns:r="http://schemas.openxmlformats.org/officeDocument/2006/relationships" xmlns:p="http://schemas.openxmlformats.org/presentationml/2006/main">
+  <p:cSld>
+    <p:spTree>
+      <p:nvGrpSpPr>
+        <p:cNvPr id="1" name="Shape 316"/>
+        <p:cNvGrpSpPr/>
+        <p:nvPr/>
+      </p:nvGrpSpPr>
+      <p:grpSpPr>
+        <a:xfrm>
+          <a:off x="0" y="0"/>
+          <a:ext cx="0" cy="0"/>
+          <a:chOff x="0" y="0"/>
+          <a:chExt cx="0" cy="0"/>
+        </a:xfrm>
+      </p:grpSpPr>
+      <p:sp>
+        <p:nvSpPr>
+          <p:cNvPr id="317" name="Google Shape;317;p34"/>
+          <p:cNvSpPr txBox="1">
+            <a:spLocks noGrp="1"/>
+          </p:cNvSpPr>
+          <p:nvPr>
+            <p:ph type="title"/>
+          </p:nvPr>
+        </p:nvSpPr>
+        <p:spPr>
+          <a:xfrm>
+            <a:off x="2749290" y="832757"/>
+            <a:ext cx="7427098" cy="578376"/>
+          </a:xfrm>
+          <a:prstGeom prst="rect">
+            <a:avLst/>
+          </a:prstGeom>
+        </p:spPr>
+        <p:txBody>
+          <a:bodyPr spcFirstLastPara="1" wrap="square" lIns="91425" tIns="91425" rIns="91425" bIns="91425" anchor="ctr" anchorCtr="0">
+            <a:noAutofit/>
+          </a:bodyPr>
+          <a:lstStyle/>
+          <a:p>
+            <a:pPr marL="0" lvl="0" indent="0" algn="l" rtl="0">
+              <a:spcBef>
+                <a:spcPts val="0"/>
+              </a:spcBef>
+              <a:spcAft>
+                <a:spcPts val="0"/>
+              </a:spcAft>
+              <a:buNone/>
+            </a:pPr>
+            <a:r>
+              <a:rPr lang="en-IN" sz="4400" b="0" dirty="0">
+                <a:latin typeface="Poppins Medium"/>
+                <a:ea typeface="Poppins Medium"/>
+                <a:cs typeface="Poppins Medium"/>
+                <a:sym typeface="Poppins Medium"/>
+              </a:rPr>
+              <a:t>Conclusion</a:t>
+            </a:r>
+            <a:endParaRPr sz="4400" b="0" dirty="0">
+              <a:latin typeface="Poppins Medium"/>
+              <a:ea typeface="Poppins Medium"/>
+              <a:cs typeface="Poppins Medium"/>
+              <a:sym typeface="Poppins Medium"/>
+            </a:endParaRPr>
+          </a:p>
+        </p:txBody>
+      </p:sp>
+      <p:sp>
+        <p:nvSpPr>
+          <p:cNvPr id="3" name="Google Shape;241;p30">
+            <a:extLst>
+              <a:ext uri="{FF2B5EF4-FFF2-40B4-BE49-F238E27FC236}">
+                <a16:creationId xmlns:a16="http://schemas.microsoft.com/office/drawing/2014/main" id="{CA616DD8-4DA9-4C77-D751-34BDD320DD9F}"/>
+              </a:ext>
+            </a:extLst>
+          </p:cNvPr>
+          <p:cNvSpPr txBox="1">
+            <a:spLocks/>
+          </p:cNvSpPr>
+          <p:nvPr/>
+        </p:nvSpPr>
+        <p:spPr>
+          <a:xfrm>
+            <a:off x="900649" y="1787548"/>
+            <a:ext cx="7232697" cy="2261937"/>
+          </a:xfrm>
+          <a:prstGeom prst="rect">
+            <a:avLst/>
+          </a:prstGeom>
+          <a:solidFill>
+            <a:schemeClr val="lt2"/>
+          </a:solidFill>
+          <a:ln w="9525" cap="flat" cmpd="sng">
+            <a:solidFill>
+              <a:schemeClr val="dk1"/>
+            </a:solidFill>
+            <a:prstDash val="solid"/>
+            <a:round/>
+            <a:headEnd type="none" w="sm" len="sm"/>
+            <a:tailEnd type="none" w="sm" len="sm"/>
+          </a:ln>
+        </p:spPr>
+        <p:txBody>
+          <a:bodyPr spcFirstLastPara="1" wrap="square" lIns="91425" tIns="91425" rIns="91425" bIns="91425" anchor="ctr" anchorCtr="0">
+            <a:noAutofit/>
+          </a:bodyPr>
+          <a:lstStyle>
+            <a:defPPr marR="0" lvl="0" algn="l" rtl="0">
+              <a:lnSpc>
+                <a:spcPct val="100000"/>
+              </a:lnSpc>
+              <a:spcBef>
+                <a:spcPts val="0"/>
+              </a:spcBef>
+              <a:spcAft>
+                <a:spcPts val="0"/>
+              </a:spcAft>
+            </a:defPPr>
+            <a:lvl1pPr marL="457200" marR="0" lvl="0" indent="-304800" algn="l" rtl="0">
+              <a:lnSpc>
+                <a:spcPct val="100000"/>
+              </a:lnSpc>
+              <a:spcBef>
+                <a:spcPts val="0"/>
+              </a:spcBef>
+              <a:spcAft>
+                <a:spcPts val="0"/>
+              </a:spcAft>
+              <a:buClr>
+                <a:schemeClr val="lt1"/>
+              </a:buClr>
+              <a:buSzPts val="1200"/>
+              <a:buFont typeface="Livvic"/>
+              <a:buNone/>
+              <a:defRPr sz="1400" b="0" i="0" u="none" strike="noStrike" cap="none">
+                <a:solidFill>
+                  <a:schemeClr val="dk1"/>
+                </a:solidFill>
+                <a:latin typeface="Livvic"/>
+                <a:ea typeface="Livvic"/>
+                <a:cs typeface="Livvic"/>
+                <a:sym typeface="Livvic"/>
+              </a:defRPr>
+            </a:lvl1pPr>
+            <a:lvl2pPr marL="914400" marR="0" lvl="1" indent="-304800" algn="l" rtl="0">
+              <a:lnSpc>
+                <a:spcPct val="115000"/>
+              </a:lnSpc>
+              <a:spcBef>
+                <a:spcPts val="0"/>
+              </a:spcBef>
+              <a:spcAft>
+                <a:spcPts val="0"/>
+              </a:spcAft>
+              <a:buClr>
+                <a:schemeClr val="lt1"/>
+              </a:buClr>
+              <a:buSzPts val="1200"/>
+              <a:buFont typeface="Livvic"/>
+              <a:buNone/>
+              <a:defRPr sz="1200" b="0" i="0" u="none" strike="noStrike" cap="none">
+                <a:solidFill>
+                  <a:schemeClr val="lt1"/>
+                </a:solidFill>
+                <a:latin typeface="Livvic"/>
+                <a:ea typeface="Livvic"/>
+                <a:cs typeface="Livvic"/>
+                <a:sym typeface="Livvic"/>
+              </a:defRPr>
+            </a:lvl2pPr>
+            <a:lvl3pPr marL="1371600" marR="0" lvl="2" indent="-304800" algn="l" rtl="0">
+              <a:lnSpc>
+                <a:spcPct val="115000"/>
+              </a:lnSpc>
+              <a:spcBef>
+                <a:spcPts val="0"/>
+              </a:spcBef>
+              <a:spcAft>
+                <a:spcPts val="0"/>
+              </a:spcAft>
+              <a:buClr>
+                <a:schemeClr val="lt1"/>
+              </a:buClr>
+              <a:buSzPts val="1200"/>
+              <a:buFont typeface="Livvic"/>
+              <a:buNone/>
+              <a:defRPr sz="1200" b="0" i="0" u="none" strike="noStrike" cap="none">
+                <a:solidFill>
+                  <a:schemeClr val="lt1"/>
+                </a:solidFill>
+                <a:latin typeface="Livvic"/>
+                <a:ea typeface="Livvic"/>
+                <a:cs typeface="Livvic"/>
+                <a:sym typeface="Livvic"/>
+              </a:defRPr>
+            </a:lvl3pPr>
+            <a:lvl4pPr marL="1828800" marR="0" lvl="3" indent="-304800" algn="l" rtl="0">
+              <a:lnSpc>
+                <a:spcPct val="115000"/>
+              </a:lnSpc>
+              <a:spcBef>
+                <a:spcPts val="0"/>
+              </a:spcBef>
+              <a:spcAft>
+                <a:spcPts val="0"/>
+              </a:spcAft>
+              <a:buClr>
+                <a:schemeClr val="lt1"/>
+              </a:buClr>
+              <a:buSzPts val="1200"/>
+              <a:buFont typeface="Livvic"/>
+              <a:buNone/>
+              <a:defRPr sz="1200" b="0" i="0" u="none" strike="noStrike" cap="none">
+                <a:solidFill>
+                  <a:schemeClr val="lt1"/>
+                </a:solidFill>
+                <a:latin typeface="Livvic"/>
+                <a:ea typeface="Livvic"/>
+                <a:cs typeface="Livvic"/>
+                <a:sym typeface="Livvic"/>
+              </a:defRPr>
+            </a:lvl4pPr>
+            <a:lvl5pPr marL="2286000" marR="0" lvl="4" indent="-304800" algn="l" rtl="0">
+              <a:lnSpc>
+                <a:spcPct val="115000"/>
+              </a:lnSpc>
+              <a:spcBef>
+                <a:spcPts val="0"/>
+              </a:spcBef>
+              <a:spcAft>
+                <a:spcPts val="0"/>
+              </a:spcAft>
+              <a:buClr>
+                <a:schemeClr val="lt1"/>
+              </a:buClr>
+              <a:buSzPts val="1200"/>
+              <a:buFont typeface="Livvic"/>
+              <a:buNone/>
+              <a:defRPr sz="1200" b="0" i="0" u="none" strike="noStrike" cap="none">
+                <a:solidFill>
+                  <a:schemeClr val="lt1"/>
+                </a:solidFill>
+                <a:latin typeface="Livvic"/>
+                <a:ea typeface="Livvic"/>
+                <a:cs typeface="Livvic"/>
+                <a:sym typeface="Livvic"/>
+              </a:defRPr>
+            </a:lvl5pPr>
+            <a:lvl6pPr marL="2743200" marR="0" lvl="5" indent="-304800" algn="l" rtl="0">
+              <a:lnSpc>
+                <a:spcPct val="115000"/>
+              </a:lnSpc>
+              <a:spcBef>
+                <a:spcPts val="0"/>
+              </a:spcBef>
+              <a:spcAft>
+                <a:spcPts val="0"/>
+              </a:spcAft>
+              <a:buClr>
+                <a:schemeClr val="lt1"/>
+              </a:buClr>
+              <a:buSzPts val="1200"/>
+              <a:buFont typeface="Livvic"/>
+              <a:buNone/>
+              <a:defRPr sz="1200" b="0" i="0" u="none" strike="noStrike" cap="none">
+                <a:solidFill>
+                  <a:schemeClr val="lt1"/>
+                </a:solidFill>
+                <a:latin typeface="Livvic"/>
+                <a:ea typeface="Livvic"/>
+                <a:cs typeface="Livvic"/>
+                <a:sym typeface="Livvic"/>
+              </a:defRPr>
+            </a:lvl6pPr>
+            <a:lvl7pPr marL="3200400" marR="0" lvl="6" indent="-304800" algn="l" rtl="0">
+              <a:lnSpc>
+                <a:spcPct val="115000"/>
+              </a:lnSpc>
+              <a:spcBef>
+                <a:spcPts val="0"/>
+              </a:spcBef>
+              <a:spcAft>
+                <a:spcPts val="0"/>
+              </a:spcAft>
+              <a:buClr>
+                <a:schemeClr val="lt1"/>
+              </a:buClr>
+              <a:buSzPts val="1200"/>
+              <a:buFont typeface="Livvic"/>
+              <a:buNone/>
+              <a:defRPr sz="1200" b="0" i="0" u="none" strike="noStrike" cap="none">
+                <a:solidFill>
+                  <a:schemeClr val="lt1"/>
+                </a:solidFill>
+                <a:latin typeface="Livvic"/>
+                <a:ea typeface="Livvic"/>
+                <a:cs typeface="Livvic"/>
+                <a:sym typeface="Livvic"/>
+              </a:defRPr>
+            </a:lvl7pPr>
+            <a:lvl8pPr marL="3657600" marR="0" lvl="7" indent="-304800" algn="l" rtl="0">
+              <a:lnSpc>
+                <a:spcPct val="115000"/>
+              </a:lnSpc>
+              <a:spcBef>
+                <a:spcPts val="0"/>
+              </a:spcBef>
+              <a:spcAft>
+                <a:spcPts val="0"/>
+              </a:spcAft>
+              <a:buClr>
+                <a:schemeClr val="lt1"/>
+              </a:buClr>
+              <a:buSzPts val="1200"/>
+              <a:buFont typeface="Livvic"/>
+              <a:buNone/>
+              <a:defRPr sz="1200" b="0" i="0" u="none" strike="noStrike" cap="none">
+                <a:solidFill>
+                  <a:schemeClr val="lt1"/>
+                </a:solidFill>
+                <a:latin typeface="Livvic"/>
+                <a:ea typeface="Livvic"/>
+                <a:cs typeface="Livvic"/>
+                <a:sym typeface="Livvic"/>
+              </a:defRPr>
+            </a:lvl8pPr>
+            <a:lvl9pPr marL="4114800" marR="0" lvl="8" indent="-304800" algn="l" rtl="0">
+              <a:lnSpc>
+                <a:spcPct val="115000"/>
+              </a:lnSpc>
+              <a:spcBef>
+                <a:spcPts val="0"/>
+              </a:spcBef>
+              <a:spcAft>
+                <a:spcPts val="0"/>
+              </a:spcAft>
+              <a:buClr>
+                <a:schemeClr val="lt1"/>
+              </a:buClr>
+              <a:buSzPts val="1200"/>
+              <a:buFont typeface="Livvic"/>
+              <a:buNone/>
+              <a:defRPr sz="1200" b="0" i="0" u="none" strike="noStrike" cap="none">
+                <a:solidFill>
+                  <a:schemeClr val="lt1"/>
+                </a:solidFill>
+                <a:latin typeface="Livvic"/>
+                <a:ea typeface="Livvic"/>
+                <a:cs typeface="Livvic"/>
+                <a:sym typeface="Livvic"/>
+              </a:defRPr>
+            </a:lvl9pPr>
+          </a:lstStyle>
+          <a:p>
+            <a:pPr algn="just"/>
+            <a:r>
+              <a:rPr lang="en-US" dirty="0"/>
+              <a:t>        </a:t>
+            </a:r>
+            <a:r>
+              <a:rPr lang="en-US" dirty="0">
+                <a:latin typeface="Calibri Light" panose="020F0302020204030204" pitchFamily="34" charset="0"/>
+                <a:ea typeface="Calibri Light" panose="020F0302020204030204" pitchFamily="34" charset="0"/>
+                <a:cs typeface="Calibri Light" panose="020F0302020204030204" pitchFamily="34" charset="0"/>
+              </a:rPr>
+              <a:t>In this examination of Lending Club loan data, our objective was to uncover the primary factors impacting loan defaults through a detailed Exploratory Data Analysis (EDA).</a:t>
+            </a:r>
+          </a:p>
+          <a:p>
+            <a:pPr algn="just"/>
+            <a:endParaRPr lang="en-US" dirty="0">
+              <a:latin typeface="Calibri Light" panose="020F0302020204030204" pitchFamily="34" charset="0"/>
+              <a:ea typeface="Calibri Light" panose="020F0302020204030204" pitchFamily="34" charset="0"/>
+              <a:cs typeface="Calibri Light" panose="020F0302020204030204" pitchFamily="34" charset="0"/>
+            </a:endParaRPr>
+          </a:p>
+          <a:p>
+            <a:pPr algn="just"/>
+            <a:r>
+              <a:rPr lang="en-US" dirty="0">
+                <a:latin typeface="Calibri Light" panose="020F0302020204030204" pitchFamily="34" charset="0"/>
+                <a:ea typeface="Calibri Light" panose="020F0302020204030204" pitchFamily="34" charset="0"/>
+                <a:cs typeface="Calibri Light" panose="020F0302020204030204" pitchFamily="34" charset="0"/>
+              </a:rPr>
+              <a:t>	The univariate and segmented univariate analyses indicated that variables like loan amount, interest rate, employment length, and debt-to-income (DTI) ratio are significant predictors of loan defaults. The bivariate analysis, which integrated these insights, reinforced our conclusions, showing that higher-risk borrowers often secured larger loans with elevated interest rates, coupled with shorter employment histories or greater financial obligations.</a:t>
+            </a:r>
+            <a:endParaRPr lang="en-US" b="1" dirty="0">
+              <a:latin typeface="Calibri Light" panose="020F0302020204030204" pitchFamily="34" charset="0"/>
+              <a:ea typeface="Calibri Light" panose="020F0302020204030204" pitchFamily="34" charset="0"/>
+              <a:cs typeface="Calibri Light" panose="020F0302020204030204" pitchFamily="34" charset="0"/>
+            </a:endParaRPr>
+          </a:p>
+        </p:txBody>
+      </p:sp>
+    </p:spTree>
+    <p:extLst>
+      <p:ext uri="{BB962C8B-B14F-4D97-AF65-F5344CB8AC3E}">
+        <p14:creationId xmlns:p14="http://schemas.microsoft.com/office/powerpoint/2010/main" val="1737370128"/>
+      </p:ext>
+    </p:extLst>
   </p:cSld>
   <p:clrMapOvr>
     <a:masterClrMapping/>

</xml_diff>